<commit_message>
Starting to work on Ontology.ttl
</commit_message>
<xml_diff>
--- a/project/OntologyBuilding.pptx
+++ b/project/OntologyBuilding.pptx
@@ -262,7 +262,7 @@
           <a:p>
             <a:fld id="{5148E13D-4BAD-4411-971D-BA7FBEB64600}" type="datetimeFigureOut">
               <a:rPr lang="de-DE" smtClean="0"/>
-              <a:t>19.11.2023</a:t>
+              <a:t>23.11.2023</a:t>
             </a:fld>
             <a:endParaRPr lang="de-DE"/>
           </a:p>
@@ -460,7 +460,7 @@
           <a:p>
             <a:fld id="{5148E13D-4BAD-4411-971D-BA7FBEB64600}" type="datetimeFigureOut">
               <a:rPr lang="de-DE" smtClean="0"/>
-              <a:t>19.11.2023</a:t>
+              <a:t>23.11.2023</a:t>
             </a:fld>
             <a:endParaRPr lang="de-DE"/>
           </a:p>
@@ -668,7 +668,7 @@
           <a:p>
             <a:fld id="{5148E13D-4BAD-4411-971D-BA7FBEB64600}" type="datetimeFigureOut">
               <a:rPr lang="de-DE" smtClean="0"/>
-              <a:t>19.11.2023</a:t>
+              <a:t>23.11.2023</a:t>
             </a:fld>
             <a:endParaRPr lang="de-DE"/>
           </a:p>
@@ -866,7 +866,7 @@
           <a:p>
             <a:fld id="{5148E13D-4BAD-4411-971D-BA7FBEB64600}" type="datetimeFigureOut">
               <a:rPr lang="de-DE" smtClean="0"/>
-              <a:t>19.11.2023</a:t>
+              <a:t>23.11.2023</a:t>
             </a:fld>
             <a:endParaRPr lang="de-DE"/>
           </a:p>
@@ -1141,7 +1141,7 @@
           <a:p>
             <a:fld id="{5148E13D-4BAD-4411-971D-BA7FBEB64600}" type="datetimeFigureOut">
               <a:rPr lang="de-DE" smtClean="0"/>
-              <a:t>19.11.2023</a:t>
+              <a:t>23.11.2023</a:t>
             </a:fld>
             <a:endParaRPr lang="de-DE"/>
           </a:p>
@@ -1406,7 +1406,7 @@
           <a:p>
             <a:fld id="{5148E13D-4BAD-4411-971D-BA7FBEB64600}" type="datetimeFigureOut">
               <a:rPr lang="de-DE" smtClean="0"/>
-              <a:t>19.11.2023</a:t>
+              <a:t>23.11.2023</a:t>
             </a:fld>
             <a:endParaRPr lang="de-DE"/>
           </a:p>
@@ -1818,7 +1818,7 @@
           <a:p>
             <a:fld id="{5148E13D-4BAD-4411-971D-BA7FBEB64600}" type="datetimeFigureOut">
               <a:rPr lang="de-DE" smtClean="0"/>
-              <a:t>19.11.2023</a:t>
+              <a:t>23.11.2023</a:t>
             </a:fld>
             <a:endParaRPr lang="de-DE"/>
           </a:p>
@@ -1959,7 +1959,7 @@
           <a:p>
             <a:fld id="{5148E13D-4BAD-4411-971D-BA7FBEB64600}" type="datetimeFigureOut">
               <a:rPr lang="de-DE" smtClean="0"/>
-              <a:t>19.11.2023</a:t>
+              <a:t>23.11.2023</a:t>
             </a:fld>
             <a:endParaRPr lang="de-DE"/>
           </a:p>
@@ -2072,7 +2072,7 @@
           <a:p>
             <a:fld id="{5148E13D-4BAD-4411-971D-BA7FBEB64600}" type="datetimeFigureOut">
               <a:rPr lang="de-DE" smtClean="0"/>
-              <a:t>19.11.2023</a:t>
+              <a:t>23.11.2023</a:t>
             </a:fld>
             <a:endParaRPr lang="de-DE"/>
           </a:p>
@@ -2383,7 +2383,7 @@
           <a:p>
             <a:fld id="{5148E13D-4BAD-4411-971D-BA7FBEB64600}" type="datetimeFigureOut">
               <a:rPr lang="de-DE" smtClean="0"/>
-              <a:t>19.11.2023</a:t>
+              <a:t>23.11.2023</a:t>
             </a:fld>
             <a:endParaRPr lang="de-DE"/>
           </a:p>
@@ -2671,7 +2671,7 @@
           <a:p>
             <a:fld id="{5148E13D-4BAD-4411-971D-BA7FBEB64600}" type="datetimeFigureOut">
               <a:rPr lang="de-DE" smtClean="0"/>
-              <a:t>19.11.2023</a:t>
+              <a:t>23.11.2023</a:t>
             </a:fld>
             <a:endParaRPr lang="de-DE"/>
           </a:p>
@@ -2912,7 +2912,7 @@
           <a:p>
             <a:fld id="{5148E13D-4BAD-4411-971D-BA7FBEB64600}" type="datetimeFigureOut">
               <a:rPr lang="de-DE" smtClean="0"/>
-              <a:t>19.11.2023</a:t>
+              <a:t>23.11.2023</a:t>
             </a:fld>
             <a:endParaRPr lang="de-DE"/>
           </a:p>
@@ -4875,6 +4875,102 @@
             </a:r>
             <a:r>
               <a:rPr lang="de-DE" sz="1200" dirty="0"/>
+              <a:t>? </a:t>
+            </a:r>
+            <a:r>
+              <a:rPr lang="de-DE" sz="1200" dirty="0" err="1"/>
+              <a:t>How</a:t>
+            </a:r>
+            <a:r>
+              <a:rPr lang="de-DE" sz="1200" dirty="0"/>
+              <a:t> </a:t>
+            </a:r>
+            <a:r>
+              <a:rPr lang="de-DE" sz="1200" dirty="0" err="1"/>
+              <a:t>much</a:t>
+            </a:r>
+            <a:r>
+              <a:rPr lang="de-DE" sz="1200" dirty="0"/>
+              <a:t> </a:t>
+            </a:r>
+            <a:r>
+              <a:rPr lang="de-DE" sz="1200" dirty="0" err="1"/>
+              <a:t>did</a:t>
+            </a:r>
+            <a:r>
+              <a:rPr lang="de-DE" sz="1200" dirty="0"/>
+              <a:t> a </a:t>
+            </a:r>
+            <a:r>
+              <a:rPr lang="de-DE" sz="1200" dirty="0" err="1"/>
+              <a:t>company</a:t>
+            </a:r>
+            <a:r>
+              <a:rPr lang="de-DE" sz="1200" dirty="0"/>
+              <a:t> </a:t>
+            </a:r>
+            <a:r>
+              <a:rPr lang="de-DE" sz="1200" dirty="0" err="1"/>
+              <a:t>receive</a:t>
+            </a:r>
+            <a:r>
+              <a:rPr lang="de-DE" sz="1200" dirty="0"/>
+              <a:t>/</a:t>
+            </a:r>
+            <a:r>
+              <a:rPr lang="de-DE" sz="1200" dirty="0" err="1"/>
+              <a:t>pay</a:t>
+            </a:r>
+            <a:r>
+              <a:rPr lang="de-DE" sz="1200" dirty="0"/>
+              <a:t> </a:t>
+            </a:r>
+            <a:r>
+              <a:rPr lang="de-DE" sz="1200" dirty="0" err="1"/>
+              <a:t>for</a:t>
+            </a:r>
+            <a:r>
+              <a:rPr lang="de-DE" sz="1200" dirty="0"/>
+              <a:t> </a:t>
+            </a:r>
+            <a:r>
+              <a:rPr lang="de-DE" sz="1200" dirty="0" err="1"/>
+              <a:t>carbon</a:t>
+            </a:r>
+            <a:r>
+              <a:rPr lang="de-DE" sz="1200" dirty="0"/>
+              <a:t> </a:t>
+            </a:r>
+            <a:r>
+              <a:rPr lang="de-DE" sz="1200" dirty="0" err="1"/>
+              <a:t>credits</a:t>
+            </a:r>
+            <a:r>
+              <a:rPr lang="de-DE" sz="1200" dirty="0"/>
+              <a:t> </a:t>
+            </a:r>
+            <a:r>
+              <a:rPr lang="de-DE" sz="1200" dirty="0" err="1"/>
+              <a:t>to</a:t>
+            </a:r>
+            <a:r>
+              <a:rPr lang="de-DE" sz="1200" dirty="0"/>
+              <a:t> alter </a:t>
+            </a:r>
+            <a:r>
+              <a:rPr lang="de-DE" sz="1200" dirty="0" err="1"/>
+              <a:t>emission</a:t>
+            </a:r>
+            <a:r>
+              <a:rPr lang="de-DE" sz="1200" dirty="0"/>
+              <a:t> </a:t>
+            </a:r>
+            <a:r>
+              <a:rPr lang="de-DE" sz="1200" dirty="0" err="1"/>
+              <a:t>statistics</a:t>
+            </a:r>
+            <a:r>
+              <a:rPr lang="de-DE" sz="1200" dirty="0"/>
               <a:t>?</a:t>
             </a:r>
           </a:p>

</xml_diff>